<commit_message>
Update Day 2 slides
</commit_message>
<xml_diff>
--- a/Workshop Day Two.pptx
+++ b/Workshop Day Two.pptx
@@ -32,14 +32,16 @@
     <p:sldId id="278" r:id="rId26"/>
     <p:sldId id="271" r:id="rId27"/>
     <p:sldId id="273" r:id="rId28"/>
-    <p:sldId id="274" r:id="rId29"/>
-    <p:sldId id="281" r:id="rId30"/>
-    <p:sldId id="279" r:id="rId31"/>
-    <p:sldId id="285" r:id="rId32"/>
-    <p:sldId id="286" r:id="rId33"/>
-    <p:sldId id="292" r:id="rId34"/>
-    <p:sldId id="293" r:id="rId35"/>
-    <p:sldId id="295" r:id="rId36"/>
+    <p:sldId id="296" r:id="rId29"/>
+    <p:sldId id="274" r:id="rId30"/>
+    <p:sldId id="281" r:id="rId31"/>
+    <p:sldId id="279" r:id="rId32"/>
+    <p:sldId id="285" r:id="rId33"/>
+    <p:sldId id="286" r:id="rId34"/>
+    <p:sldId id="292" r:id="rId35"/>
+    <p:sldId id="293" r:id="rId36"/>
+    <p:sldId id="297" r:id="rId37"/>
+    <p:sldId id="295" r:id="rId38"/>
   </p:sldIdLst>
   <p:sldSz cx="12192000" cy="6858000"/>
   <p:notesSz cx="6858000" cy="9144000"/>
@@ -8569,7 +8571,18 @@
             <p:ph idx="1"/>
           </p:nvPr>
         </p:nvSpPr>
-        <p:spPr/>
+        <p:spPr>
+          <a:xfrm>
+            <a:off x="2882534" y="1732449"/>
+            <a:ext cx="6610178" cy="4058751"/>
+          </a:xfrm>
+          <a:solidFill>
+            <a:schemeClr val="bg1">
+              <a:lumMod val="85000"/>
+              <a:lumOff val="15000"/>
+            </a:schemeClr>
+          </a:solidFill>
+        </p:spPr>
         <p:txBody>
           <a:bodyPr/>
           <a:lstStyle/>
@@ -8648,7 +8661,37 @@
                 <a:latin typeface="Cascadia Mono" panose="020B0609020000020004" pitchFamily="49" charset="0"/>
                 <a:cs typeface="Cascadia Mono" panose="020B0609020000020004" pitchFamily="49" charset="0"/>
               </a:rPr>
-              <a:t> dashboard</a:t>
+              <a:t> viz install | </a:t>
+            </a:r>
+            <a:r>
+              <a:rPr lang="en-GB" dirty="0" err="1">
+                <a:latin typeface="Cascadia Mono" panose="020B0609020000020004" pitchFamily="49" charset="0"/>
+                <a:cs typeface="Cascadia Mono" panose="020B0609020000020004" pitchFamily="49" charset="0"/>
+              </a:rPr>
+              <a:t>kubectl</a:t>
+            </a:r>
+            <a:r>
+              <a:rPr lang="en-GB" dirty="0">
+                <a:latin typeface="Cascadia Mono" panose="020B0609020000020004" pitchFamily="49" charset="0"/>
+                <a:cs typeface="Cascadia Mono" panose="020B0609020000020004" pitchFamily="49" charset="0"/>
+              </a:rPr>
+              <a:t> apply –f -</a:t>
+            </a:r>
+          </a:p>
+          <a:p>
+            <a:r>
+              <a:rPr lang="en-GB" dirty="0" err="1">
+                <a:latin typeface="Cascadia Mono" panose="020B0609020000020004" pitchFamily="49" charset="0"/>
+                <a:cs typeface="Cascadia Mono" panose="020B0609020000020004" pitchFamily="49" charset="0"/>
+              </a:rPr>
+              <a:t>linkerd</a:t>
+            </a:r>
+            <a:r>
+              <a:rPr lang="en-GB" dirty="0">
+                <a:latin typeface="Cascadia Mono" panose="020B0609020000020004" pitchFamily="49" charset="0"/>
+                <a:cs typeface="Cascadia Mono" panose="020B0609020000020004" pitchFamily="49" charset="0"/>
+              </a:rPr>
+              <a:t> viz dashboard</a:t>
             </a:r>
           </a:p>
         </p:txBody>
@@ -8663,6 +8706,344 @@
   <p:clrMapOvr>
     <a:masterClrMapping/>
   </p:clrMapOvr>
+  <p:timing>
+    <p:tnLst>
+      <p:par>
+        <p:cTn id="1" dur="indefinite" restart="never" nodeType="tmRoot">
+          <p:childTnLst>
+            <p:seq concurrent="1" nextAc="seek">
+              <p:cTn id="2" dur="indefinite" nodeType="mainSeq">
+                <p:childTnLst>
+                  <p:par>
+                    <p:cTn id="3" fill="hold">
+                      <p:stCondLst>
+                        <p:cond delay="indefinite"/>
+                      </p:stCondLst>
+                      <p:childTnLst>
+                        <p:par>
+                          <p:cTn id="4" fill="hold">
+                            <p:stCondLst>
+                              <p:cond delay="0"/>
+                            </p:stCondLst>
+                            <p:childTnLst>
+                              <p:par>
+                                <p:cTn id="5" presetID="10" presetClass="entr" presetSubtype="0" fill="hold" grpId="0" nodeType="clickEffect">
+                                  <p:stCondLst>
+                                    <p:cond delay="0"/>
+                                  </p:stCondLst>
+                                  <p:childTnLst>
+                                    <p:set>
+                                      <p:cBhvr>
+                                        <p:cTn id="6" dur="1" fill="hold">
+                                          <p:stCondLst>
+                                            <p:cond delay="0"/>
+                                          </p:stCondLst>
+                                        </p:cTn>
+                                        <p:tgtEl>
+                                          <p:spTgt spid="3">
+                                            <p:txEl>
+                                              <p:pRg st="0" end="0"/>
+                                            </p:txEl>
+                                          </p:spTgt>
+                                        </p:tgtEl>
+                                        <p:attrNameLst>
+                                          <p:attrName>style.visibility</p:attrName>
+                                        </p:attrNameLst>
+                                      </p:cBhvr>
+                                      <p:to>
+                                        <p:strVal val="visible"/>
+                                      </p:to>
+                                    </p:set>
+                                    <p:animEffect transition="in" filter="fade">
+                                      <p:cBhvr>
+                                        <p:cTn id="7" dur="500"/>
+                                        <p:tgtEl>
+                                          <p:spTgt spid="3">
+                                            <p:txEl>
+                                              <p:pRg st="0" end="0"/>
+                                            </p:txEl>
+                                          </p:spTgt>
+                                        </p:tgtEl>
+                                      </p:cBhvr>
+                                    </p:animEffect>
+                                  </p:childTnLst>
+                                </p:cTn>
+                              </p:par>
+                            </p:childTnLst>
+                          </p:cTn>
+                        </p:par>
+                      </p:childTnLst>
+                    </p:cTn>
+                  </p:par>
+                  <p:par>
+                    <p:cTn id="8" fill="hold">
+                      <p:stCondLst>
+                        <p:cond delay="indefinite"/>
+                      </p:stCondLst>
+                      <p:childTnLst>
+                        <p:par>
+                          <p:cTn id="9" fill="hold">
+                            <p:stCondLst>
+                              <p:cond delay="0"/>
+                            </p:stCondLst>
+                            <p:childTnLst>
+                              <p:par>
+                                <p:cTn id="10" presetID="10" presetClass="entr" presetSubtype="0" fill="hold" grpId="0" nodeType="clickEffect">
+                                  <p:stCondLst>
+                                    <p:cond delay="0"/>
+                                  </p:stCondLst>
+                                  <p:childTnLst>
+                                    <p:set>
+                                      <p:cBhvr>
+                                        <p:cTn id="11" dur="1" fill="hold">
+                                          <p:stCondLst>
+                                            <p:cond delay="0"/>
+                                          </p:stCondLst>
+                                        </p:cTn>
+                                        <p:tgtEl>
+                                          <p:spTgt spid="3">
+                                            <p:txEl>
+                                              <p:pRg st="1" end="1"/>
+                                            </p:txEl>
+                                          </p:spTgt>
+                                        </p:tgtEl>
+                                        <p:attrNameLst>
+                                          <p:attrName>style.visibility</p:attrName>
+                                        </p:attrNameLst>
+                                      </p:cBhvr>
+                                      <p:to>
+                                        <p:strVal val="visible"/>
+                                      </p:to>
+                                    </p:set>
+                                    <p:animEffect transition="in" filter="fade">
+                                      <p:cBhvr>
+                                        <p:cTn id="12" dur="500"/>
+                                        <p:tgtEl>
+                                          <p:spTgt spid="3">
+                                            <p:txEl>
+                                              <p:pRg st="1" end="1"/>
+                                            </p:txEl>
+                                          </p:spTgt>
+                                        </p:tgtEl>
+                                      </p:cBhvr>
+                                    </p:animEffect>
+                                  </p:childTnLst>
+                                </p:cTn>
+                              </p:par>
+                            </p:childTnLst>
+                          </p:cTn>
+                        </p:par>
+                      </p:childTnLst>
+                    </p:cTn>
+                  </p:par>
+                  <p:par>
+                    <p:cTn id="13" fill="hold">
+                      <p:stCondLst>
+                        <p:cond delay="indefinite"/>
+                      </p:stCondLst>
+                      <p:childTnLst>
+                        <p:par>
+                          <p:cTn id="14" fill="hold">
+                            <p:stCondLst>
+                              <p:cond delay="0"/>
+                            </p:stCondLst>
+                            <p:childTnLst>
+                              <p:par>
+                                <p:cTn id="15" presetID="10" presetClass="entr" presetSubtype="0" fill="hold" grpId="0" nodeType="clickEffect">
+                                  <p:stCondLst>
+                                    <p:cond delay="0"/>
+                                  </p:stCondLst>
+                                  <p:childTnLst>
+                                    <p:set>
+                                      <p:cBhvr>
+                                        <p:cTn id="16" dur="1" fill="hold">
+                                          <p:stCondLst>
+                                            <p:cond delay="0"/>
+                                          </p:stCondLst>
+                                        </p:cTn>
+                                        <p:tgtEl>
+                                          <p:spTgt spid="3">
+                                            <p:txEl>
+                                              <p:pRg st="2" end="2"/>
+                                            </p:txEl>
+                                          </p:spTgt>
+                                        </p:tgtEl>
+                                        <p:attrNameLst>
+                                          <p:attrName>style.visibility</p:attrName>
+                                        </p:attrNameLst>
+                                      </p:cBhvr>
+                                      <p:to>
+                                        <p:strVal val="visible"/>
+                                      </p:to>
+                                    </p:set>
+                                    <p:animEffect transition="in" filter="fade">
+                                      <p:cBhvr>
+                                        <p:cTn id="17" dur="500"/>
+                                        <p:tgtEl>
+                                          <p:spTgt spid="3">
+                                            <p:txEl>
+                                              <p:pRg st="2" end="2"/>
+                                            </p:txEl>
+                                          </p:spTgt>
+                                        </p:tgtEl>
+                                      </p:cBhvr>
+                                    </p:animEffect>
+                                  </p:childTnLst>
+                                </p:cTn>
+                              </p:par>
+                            </p:childTnLst>
+                          </p:cTn>
+                        </p:par>
+                      </p:childTnLst>
+                    </p:cTn>
+                  </p:par>
+                  <p:par>
+                    <p:cTn id="18" fill="hold">
+                      <p:stCondLst>
+                        <p:cond delay="indefinite"/>
+                      </p:stCondLst>
+                      <p:childTnLst>
+                        <p:par>
+                          <p:cTn id="19" fill="hold">
+                            <p:stCondLst>
+                              <p:cond delay="0"/>
+                            </p:stCondLst>
+                            <p:childTnLst>
+                              <p:par>
+                                <p:cTn id="20" presetID="10" presetClass="entr" presetSubtype="0" fill="hold" grpId="0" nodeType="clickEffect">
+                                  <p:stCondLst>
+                                    <p:cond delay="0"/>
+                                  </p:stCondLst>
+                                  <p:childTnLst>
+                                    <p:set>
+                                      <p:cBhvr>
+                                        <p:cTn id="21" dur="1" fill="hold">
+                                          <p:stCondLst>
+                                            <p:cond delay="0"/>
+                                          </p:stCondLst>
+                                        </p:cTn>
+                                        <p:tgtEl>
+                                          <p:spTgt spid="3">
+                                            <p:txEl>
+                                              <p:pRg st="3" end="3"/>
+                                            </p:txEl>
+                                          </p:spTgt>
+                                        </p:tgtEl>
+                                        <p:attrNameLst>
+                                          <p:attrName>style.visibility</p:attrName>
+                                        </p:attrNameLst>
+                                      </p:cBhvr>
+                                      <p:to>
+                                        <p:strVal val="visible"/>
+                                      </p:to>
+                                    </p:set>
+                                    <p:animEffect transition="in" filter="fade">
+                                      <p:cBhvr>
+                                        <p:cTn id="22" dur="500"/>
+                                        <p:tgtEl>
+                                          <p:spTgt spid="3">
+                                            <p:txEl>
+                                              <p:pRg st="3" end="3"/>
+                                            </p:txEl>
+                                          </p:spTgt>
+                                        </p:tgtEl>
+                                      </p:cBhvr>
+                                    </p:animEffect>
+                                  </p:childTnLst>
+                                </p:cTn>
+                              </p:par>
+                            </p:childTnLst>
+                          </p:cTn>
+                        </p:par>
+                      </p:childTnLst>
+                    </p:cTn>
+                  </p:par>
+                  <p:par>
+                    <p:cTn id="23" fill="hold">
+                      <p:stCondLst>
+                        <p:cond delay="indefinite"/>
+                      </p:stCondLst>
+                      <p:childTnLst>
+                        <p:par>
+                          <p:cTn id="24" fill="hold">
+                            <p:stCondLst>
+                              <p:cond delay="0"/>
+                            </p:stCondLst>
+                            <p:childTnLst>
+                              <p:par>
+                                <p:cTn id="25" presetID="10" presetClass="entr" presetSubtype="0" fill="hold" grpId="0" nodeType="clickEffect">
+                                  <p:stCondLst>
+                                    <p:cond delay="0"/>
+                                  </p:stCondLst>
+                                  <p:childTnLst>
+                                    <p:set>
+                                      <p:cBhvr>
+                                        <p:cTn id="26" dur="1" fill="hold">
+                                          <p:stCondLst>
+                                            <p:cond delay="0"/>
+                                          </p:stCondLst>
+                                        </p:cTn>
+                                        <p:tgtEl>
+                                          <p:spTgt spid="3">
+                                            <p:txEl>
+                                              <p:pRg st="4" end="4"/>
+                                            </p:txEl>
+                                          </p:spTgt>
+                                        </p:tgtEl>
+                                        <p:attrNameLst>
+                                          <p:attrName>style.visibility</p:attrName>
+                                        </p:attrNameLst>
+                                      </p:cBhvr>
+                                      <p:to>
+                                        <p:strVal val="visible"/>
+                                      </p:to>
+                                    </p:set>
+                                    <p:animEffect transition="in" filter="fade">
+                                      <p:cBhvr>
+                                        <p:cTn id="27" dur="500"/>
+                                        <p:tgtEl>
+                                          <p:spTgt spid="3">
+                                            <p:txEl>
+                                              <p:pRg st="4" end="4"/>
+                                            </p:txEl>
+                                          </p:spTgt>
+                                        </p:tgtEl>
+                                      </p:cBhvr>
+                                    </p:animEffect>
+                                  </p:childTnLst>
+                                </p:cTn>
+                              </p:par>
+                            </p:childTnLst>
+                          </p:cTn>
+                        </p:par>
+                      </p:childTnLst>
+                    </p:cTn>
+                  </p:par>
+                </p:childTnLst>
+              </p:cTn>
+              <p:prevCondLst>
+                <p:cond evt="onPrev" delay="0">
+                  <p:tgtEl>
+                    <p:sldTgt/>
+                  </p:tgtEl>
+                </p:cond>
+              </p:prevCondLst>
+              <p:nextCondLst>
+                <p:cond evt="onNext" delay="0">
+                  <p:tgtEl>
+                    <p:sldTgt/>
+                  </p:tgtEl>
+                </p:cond>
+              </p:nextCondLst>
+            </p:seq>
+          </p:childTnLst>
+        </p:cTn>
+      </p:par>
+    </p:tnLst>
+    <p:bldLst>
+      <p:bldP spid="3" grpId="0" build="p"/>
+    </p:bldLst>
+  </p:timing>
 </p:sld>
 </file>
 
@@ -9032,6 +9413,154 @@
           <a:p>
             <a:r>
               <a:rPr lang="en-GB" dirty="0"/>
+              <a:t>Distributed Tracing Libraries</a:t>
+            </a:r>
+          </a:p>
+        </p:txBody>
+      </p:sp>
+      <p:sp>
+        <p:nvSpPr>
+          <p:cNvPr id="3" name="Content Placeholder 2">
+            <a:extLst>
+              <a:ext uri="{FF2B5EF4-FFF2-40B4-BE49-F238E27FC236}">
+                <a16:creationId xmlns:a16="http://schemas.microsoft.com/office/drawing/2014/main" id="{C77FDB7E-E6A2-4F3E-9953-43C2B0628ED7}"/>
+              </a:ext>
+            </a:extLst>
+          </p:cNvPr>
+          <p:cNvSpPr>
+            <a:spLocks noGrp="1"/>
+          </p:cNvSpPr>
+          <p:nvPr>
+            <p:ph idx="1"/>
+          </p:nvPr>
+        </p:nvSpPr>
+        <p:spPr>
+          <a:xfrm>
+            <a:off x="4644199" y="1732449"/>
+            <a:ext cx="2903603" cy="4058751"/>
+          </a:xfrm>
+        </p:spPr>
+        <p:txBody>
+          <a:bodyPr>
+            <a:normAutofit/>
+          </a:bodyPr>
+          <a:lstStyle/>
+          <a:p>
+            <a:r>
+              <a:rPr lang="en-GB" sz="2800" strike="sngStrike" dirty="0" err="1">
+                <a:solidFill>
+                  <a:schemeClr val="tx1">
+                    <a:lumMod val="50000"/>
+                  </a:schemeClr>
+                </a:solidFill>
+              </a:rPr>
+              <a:t>OpenTracing</a:t>
+            </a:r>
+            <a:endParaRPr lang="en-GB" sz="2800" strike="sngStrike" dirty="0">
+              <a:solidFill>
+                <a:schemeClr val="tx1">
+                  <a:lumMod val="50000"/>
+                </a:schemeClr>
+              </a:solidFill>
+            </a:endParaRPr>
+          </a:p>
+          <a:p>
+            <a:r>
+              <a:rPr lang="en-GB" sz="2800" strike="sngStrike" dirty="0" err="1">
+                <a:solidFill>
+                  <a:schemeClr val="tx1">
+                    <a:lumMod val="50000"/>
+                  </a:schemeClr>
+                </a:solidFill>
+                <a:effectLst/>
+              </a:rPr>
+              <a:t>OpenCensus</a:t>
+            </a:r>
+            <a:endParaRPr lang="en-GB" sz="2800" strike="sngStrike" dirty="0">
+              <a:solidFill>
+                <a:schemeClr val="tx1">
+                  <a:lumMod val="50000"/>
+                </a:schemeClr>
+              </a:solidFill>
+              <a:effectLst/>
+            </a:endParaRPr>
+          </a:p>
+          <a:p>
+            <a:r>
+              <a:rPr lang="en-GB" sz="2800" dirty="0" err="1">
+                <a:solidFill>
+                  <a:schemeClr val="accent1">
+                    <a:lumMod val="60000"/>
+                    <a:lumOff val="40000"/>
+                  </a:schemeClr>
+                </a:solidFill>
+              </a:rPr>
+              <a:t>OpenTelemetry</a:t>
+            </a:r>
+            <a:endParaRPr lang="en-GB" sz="2800" dirty="0">
+              <a:solidFill>
+                <a:schemeClr val="accent1">
+                  <a:lumMod val="60000"/>
+                  <a:lumOff val="40000"/>
+                </a:schemeClr>
+              </a:solidFill>
+            </a:endParaRPr>
+          </a:p>
+        </p:txBody>
+      </p:sp>
+    </p:spTree>
+    <p:extLst>
+      <p:ext uri="{BB962C8B-B14F-4D97-AF65-F5344CB8AC3E}">
+        <p14:creationId xmlns:p14="http://schemas.microsoft.com/office/powerpoint/2010/main" val="3821134008"/>
+      </p:ext>
+    </p:extLst>
+  </p:cSld>
+  <p:clrMapOvr>
+    <a:masterClrMapping/>
+  </p:clrMapOvr>
+</p:sld>
+</file>
+
+<file path=ppt/slides/slide29.xml><?xml version="1.0" encoding="utf-8"?>
+<p:sld xmlns:a="http://schemas.openxmlformats.org/drawingml/2006/main" xmlns:r="http://schemas.openxmlformats.org/officeDocument/2006/relationships" xmlns:p="http://schemas.openxmlformats.org/presentationml/2006/main">
+  <p:cSld>
+    <p:spTree>
+      <p:nvGrpSpPr>
+        <p:cNvPr id="1" name=""/>
+        <p:cNvGrpSpPr/>
+        <p:nvPr/>
+      </p:nvGrpSpPr>
+      <p:grpSpPr>
+        <a:xfrm>
+          <a:off x="0" y="0"/>
+          <a:ext cx="0" cy="0"/>
+          <a:chOff x="0" y="0"/>
+          <a:chExt cx="0" cy="0"/>
+        </a:xfrm>
+      </p:grpSpPr>
+      <p:sp>
+        <p:nvSpPr>
+          <p:cNvPr id="2" name="Title 1">
+            <a:extLst>
+              <a:ext uri="{FF2B5EF4-FFF2-40B4-BE49-F238E27FC236}">
+                <a16:creationId xmlns:a16="http://schemas.microsoft.com/office/drawing/2014/main" id="{CBBDF8A1-A42D-4193-B255-C5C2719AFD3F}"/>
+              </a:ext>
+            </a:extLst>
+          </p:cNvPr>
+          <p:cNvSpPr>
+            <a:spLocks noGrp="1"/>
+          </p:cNvSpPr>
+          <p:nvPr>
+            <p:ph type="title"/>
+          </p:nvPr>
+        </p:nvSpPr>
+        <p:spPr/>
+        <p:txBody>
+          <a:bodyPr/>
+          <a:lstStyle/>
+          <a:p>
+            <a:r>
+              <a:rPr lang="en-GB" dirty="0"/>
               <a:t>Distributed Tracing Platforms</a:t>
             </a:r>
           </a:p>
@@ -9092,7 +9621,90 @@
 </p:sld>
 </file>
 
-<file path=ppt/slides/slide29.xml><?xml version="1.0" encoding="utf-8"?>
+<file path=ppt/slides/slide3.xml><?xml version="1.0" encoding="utf-8"?>
+<p:sld xmlns:a="http://schemas.openxmlformats.org/drawingml/2006/main" xmlns:r="http://schemas.openxmlformats.org/officeDocument/2006/relationships" xmlns:p="http://schemas.openxmlformats.org/presentationml/2006/main">
+  <p:cSld>
+    <p:spTree>
+      <p:nvGrpSpPr>
+        <p:cNvPr id="1" name=""/>
+        <p:cNvGrpSpPr/>
+        <p:nvPr/>
+      </p:nvGrpSpPr>
+      <p:grpSpPr>
+        <a:xfrm>
+          <a:off x="0" y="0"/>
+          <a:ext cx="0" cy="0"/>
+          <a:chOff x="0" y="0"/>
+          <a:chExt cx="0" cy="0"/>
+        </a:xfrm>
+      </p:grpSpPr>
+      <p:sp>
+        <p:nvSpPr>
+          <p:cNvPr id="2" name="Title 1">
+            <a:extLst>
+              <a:ext uri="{FF2B5EF4-FFF2-40B4-BE49-F238E27FC236}">
+                <a16:creationId xmlns:a16="http://schemas.microsoft.com/office/drawing/2014/main" id="{99DC74A9-7D9A-48E6-B3E0-037DCD947006}"/>
+              </a:ext>
+            </a:extLst>
+          </p:cNvPr>
+          <p:cNvSpPr>
+            <a:spLocks noGrp="1"/>
+          </p:cNvSpPr>
+          <p:nvPr>
+            <p:ph type="title"/>
+          </p:nvPr>
+        </p:nvSpPr>
+        <p:spPr/>
+        <p:txBody>
+          <a:bodyPr/>
+          <a:lstStyle/>
+          <a:p>
+            <a:r>
+              <a:rPr lang="en-GB" dirty="0"/>
+              <a:t>gRPC Security</a:t>
+            </a:r>
+          </a:p>
+        </p:txBody>
+      </p:sp>
+      <p:sp>
+        <p:nvSpPr>
+          <p:cNvPr id="3" name="Text Placeholder 2">
+            <a:extLst>
+              <a:ext uri="{FF2B5EF4-FFF2-40B4-BE49-F238E27FC236}">
+                <a16:creationId xmlns:a16="http://schemas.microsoft.com/office/drawing/2014/main" id="{9F49E614-7EC6-4A77-956C-909FD6EA117F}"/>
+              </a:ext>
+            </a:extLst>
+          </p:cNvPr>
+          <p:cNvSpPr>
+            <a:spLocks noGrp="1"/>
+          </p:cNvSpPr>
+          <p:nvPr>
+            <p:ph type="body" idx="1"/>
+          </p:nvPr>
+        </p:nvSpPr>
+        <p:spPr/>
+        <p:txBody>
+          <a:bodyPr/>
+          <a:lstStyle/>
+          <a:p>
+            <a:endParaRPr lang="en-GB"/>
+          </a:p>
+        </p:txBody>
+      </p:sp>
+    </p:spTree>
+    <p:extLst>
+      <p:ext uri="{BB962C8B-B14F-4D97-AF65-F5344CB8AC3E}">
+        <p14:creationId xmlns:p14="http://schemas.microsoft.com/office/powerpoint/2010/main" val="3310204676"/>
+      </p:ext>
+    </p:extLst>
+  </p:cSld>
+  <p:clrMapOvr>
+    <a:masterClrMapping/>
+  </p:clrMapOvr>
+</p:sld>
+</file>
+
+<file path=ppt/slides/slide30.xml><?xml version="1.0" encoding="utf-8"?>
 <p:sld xmlns:a="http://schemas.openxmlformats.org/drawingml/2006/main" xmlns:r="http://schemas.openxmlformats.org/officeDocument/2006/relationships" xmlns:p="http://schemas.openxmlformats.org/presentationml/2006/main">
   <p:cSld>
     <p:spTree>
@@ -9872,273 +10484,6 @@
 </p:sld>
 </file>
 
-<file path=ppt/slides/slide3.xml><?xml version="1.0" encoding="utf-8"?>
-<p:sld xmlns:a="http://schemas.openxmlformats.org/drawingml/2006/main" xmlns:r="http://schemas.openxmlformats.org/officeDocument/2006/relationships" xmlns:p="http://schemas.openxmlformats.org/presentationml/2006/main">
-  <p:cSld>
-    <p:spTree>
-      <p:nvGrpSpPr>
-        <p:cNvPr id="1" name=""/>
-        <p:cNvGrpSpPr/>
-        <p:nvPr/>
-      </p:nvGrpSpPr>
-      <p:grpSpPr>
-        <a:xfrm>
-          <a:off x="0" y="0"/>
-          <a:ext cx="0" cy="0"/>
-          <a:chOff x="0" y="0"/>
-          <a:chExt cx="0" cy="0"/>
-        </a:xfrm>
-      </p:grpSpPr>
-      <p:sp>
-        <p:nvSpPr>
-          <p:cNvPr id="2" name="Title 1">
-            <a:extLst>
-              <a:ext uri="{FF2B5EF4-FFF2-40B4-BE49-F238E27FC236}">
-                <a16:creationId xmlns:a16="http://schemas.microsoft.com/office/drawing/2014/main" id="{99DC74A9-7D9A-48E6-B3E0-037DCD947006}"/>
-              </a:ext>
-            </a:extLst>
-          </p:cNvPr>
-          <p:cNvSpPr>
-            <a:spLocks noGrp="1"/>
-          </p:cNvSpPr>
-          <p:nvPr>
-            <p:ph type="title"/>
-          </p:nvPr>
-        </p:nvSpPr>
-        <p:spPr/>
-        <p:txBody>
-          <a:bodyPr/>
-          <a:lstStyle/>
-          <a:p>
-            <a:r>
-              <a:rPr lang="en-GB" dirty="0"/>
-              <a:t>gRPC Security</a:t>
-            </a:r>
-          </a:p>
-        </p:txBody>
-      </p:sp>
-      <p:sp>
-        <p:nvSpPr>
-          <p:cNvPr id="3" name="Text Placeholder 2">
-            <a:extLst>
-              <a:ext uri="{FF2B5EF4-FFF2-40B4-BE49-F238E27FC236}">
-                <a16:creationId xmlns:a16="http://schemas.microsoft.com/office/drawing/2014/main" id="{9F49E614-7EC6-4A77-956C-909FD6EA117F}"/>
-              </a:ext>
-            </a:extLst>
-          </p:cNvPr>
-          <p:cNvSpPr>
-            <a:spLocks noGrp="1"/>
-          </p:cNvSpPr>
-          <p:nvPr>
-            <p:ph type="body" idx="1"/>
-          </p:nvPr>
-        </p:nvSpPr>
-        <p:spPr/>
-        <p:txBody>
-          <a:bodyPr/>
-          <a:lstStyle/>
-          <a:p>
-            <a:endParaRPr lang="en-GB"/>
-          </a:p>
-        </p:txBody>
-      </p:sp>
-    </p:spTree>
-    <p:extLst>
-      <p:ext uri="{BB962C8B-B14F-4D97-AF65-F5344CB8AC3E}">
-        <p14:creationId xmlns:p14="http://schemas.microsoft.com/office/powerpoint/2010/main" val="3310204676"/>
-      </p:ext>
-    </p:extLst>
-  </p:cSld>
-  <p:clrMapOvr>
-    <a:masterClrMapping/>
-  </p:clrMapOvr>
-</p:sld>
-</file>
-
-<file path=ppt/slides/slide30.xml><?xml version="1.0" encoding="utf-8"?>
-<p:sld xmlns:a="http://schemas.openxmlformats.org/drawingml/2006/main" xmlns:r="http://schemas.openxmlformats.org/officeDocument/2006/relationships" xmlns:p="http://schemas.openxmlformats.org/presentationml/2006/main">
-  <p:cSld>
-    <p:spTree>
-      <p:nvGrpSpPr>
-        <p:cNvPr id="1" name=""/>
-        <p:cNvGrpSpPr/>
-        <p:nvPr/>
-      </p:nvGrpSpPr>
-      <p:grpSpPr>
-        <a:xfrm>
-          <a:off x="0" y="0"/>
-          <a:ext cx="0" cy="0"/>
-          <a:chOff x="0" y="0"/>
-          <a:chExt cx="0" cy="0"/>
-        </a:xfrm>
-      </p:grpSpPr>
-      <p:sp>
-        <p:nvSpPr>
-          <p:cNvPr id="2" name="Title 1">
-            <a:extLst>
-              <a:ext uri="{FF2B5EF4-FFF2-40B4-BE49-F238E27FC236}">
-                <a16:creationId xmlns:a16="http://schemas.microsoft.com/office/drawing/2014/main" id="{71DD7F62-F4EA-40E3-A92E-6C2291D6942D}"/>
-              </a:ext>
-            </a:extLst>
-          </p:cNvPr>
-          <p:cNvSpPr>
-            <a:spLocks noGrp="1"/>
-          </p:cNvSpPr>
-          <p:nvPr>
-            <p:ph type="title"/>
-          </p:nvPr>
-        </p:nvSpPr>
-        <p:spPr/>
-        <p:txBody>
-          <a:bodyPr/>
-          <a:lstStyle/>
-          <a:p>
-            <a:r>
-              <a:rPr lang="en-GB" dirty="0"/>
-              <a:t>Jaeger Packages</a:t>
-            </a:r>
-          </a:p>
-        </p:txBody>
-      </p:sp>
-      <p:sp>
-        <p:nvSpPr>
-          <p:cNvPr id="3" name="Content Placeholder 2">
-            <a:extLst>
-              <a:ext uri="{FF2B5EF4-FFF2-40B4-BE49-F238E27FC236}">
-                <a16:creationId xmlns:a16="http://schemas.microsoft.com/office/drawing/2014/main" id="{0DBFB599-BE8F-4683-BE8A-81E173801E1F}"/>
-              </a:ext>
-            </a:extLst>
-          </p:cNvPr>
-          <p:cNvSpPr>
-            <a:spLocks noGrp="1"/>
-          </p:cNvSpPr>
-          <p:nvPr>
-            <p:ph idx="1"/>
-          </p:nvPr>
-        </p:nvSpPr>
-        <p:spPr>
-          <a:xfrm>
-            <a:off x="2874935" y="2112158"/>
-            <a:ext cx="6757261" cy="4058751"/>
-          </a:xfrm>
-        </p:spPr>
-        <p:txBody>
-          <a:bodyPr/>
-          <a:lstStyle/>
-          <a:p>
-            <a:r>
-              <a:rPr lang="en-GB" dirty="0" err="1">
-                <a:solidFill>
-                  <a:schemeClr val="accent1"/>
-                </a:solidFill>
-                <a:latin typeface="Cascadia Mono" panose="020B0609020000020004" pitchFamily="49" charset="0"/>
-                <a:cs typeface="Cascadia Mono" panose="020B0609020000020004" pitchFamily="49" charset="0"/>
-              </a:rPr>
-              <a:t>OpenTelemetry.Hosting.Extensions</a:t>
-            </a:r>
-            <a:endParaRPr lang="en-GB" dirty="0"/>
-          </a:p>
-          <a:p>
-            <a:pPr lvl="1"/>
-            <a:r>
-              <a:rPr lang="en-GB" dirty="0"/>
-              <a:t>The core </a:t>
-            </a:r>
-            <a:r>
-              <a:rPr lang="en-GB" dirty="0" err="1"/>
-              <a:t>OpenTelemetry</a:t>
-            </a:r>
-            <a:r>
-              <a:rPr lang="en-GB" dirty="0"/>
-              <a:t> library</a:t>
-            </a:r>
-          </a:p>
-          <a:p>
-            <a:r>
-              <a:rPr lang="en-GB" dirty="0" err="1">
-                <a:solidFill>
-                  <a:schemeClr val="accent1"/>
-                </a:solidFill>
-                <a:latin typeface="Cascadia Mono" panose="020B0609020000020004" pitchFamily="49" charset="0"/>
-                <a:cs typeface="Cascadia Mono" panose="020B0609020000020004" pitchFamily="49" charset="0"/>
-              </a:rPr>
-              <a:t>OpenTelemetry.Exporter.Jaeger</a:t>
-            </a:r>
-            <a:endParaRPr lang="en-GB" dirty="0"/>
-          </a:p>
-          <a:p>
-            <a:pPr lvl="1"/>
-            <a:r>
-              <a:rPr lang="en-GB" dirty="0"/>
-              <a:t>Exporter for Jaeger</a:t>
-            </a:r>
-          </a:p>
-          <a:p>
-            <a:r>
-              <a:rPr lang="en-GB" dirty="0" err="1">
-                <a:solidFill>
-                  <a:schemeClr val="accent1"/>
-                </a:solidFill>
-                <a:latin typeface="Cascadia Mono" panose="020B0609020000020004" pitchFamily="49" charset="0"/>
-                <a:cs typeface="Cascadia Mono" panose="020B0609020000020004" pitchFamily="49" charset="0"/>
-              </a:rPr>
-              <a:t>OpenTelemetry.Instrumentation.AspNetCore</a:t>
-            </a:r>
-            <a:endParaRPr lang="en-GB" dirty="0"/>
-          </a:p>
-          <a:p>
-            <a:pPr lvl="1"/>
-            <a:r>
-              <a:rPr lang="en-GB" dirty="0"/>
-              <a:t>Magic instrumentation for ASP.NET Core</a:t>
-            </a:r>
-          </a:p>
-          <a:p>
-            <a:r>
-              <a:rPr lang="en-GB" dirty="0" err="1">
-                <a:solidFill>
-                  <a:schemeClr val="accent1"/>
-                </a:solidFill>
-                <a:latin typeface="Cascadia Mono" panose="020B0609020000020004" pitchFamily="49" charset="0"/>
-                <a:cs typeface="Cascadia Mono" panose="020B0609020000020004" pitchFamily="49" charset="0"/>
-              </a:rPr>
-              <a:t>OpenTelemetry.Instrumentation.Http</a:t>
-            </a:r>
-            <a:endParaRPr lang="en-GB" dirty="0"/>
-          </a:p>
-          <a:p>
-            <a:pPr lvl="1"/>
-            <a:r>
-              <a:rPr lang="en-GB" dirty="0"/>
-              <a:t>Magic instrumentation for </a:t>
-            </a:r>
-            <a:r>
-              <a:rPr lang="en-GB" dirty="0" err="1"/>
-              <a:t>HttpClient</a:t>
-            </a:r>
-            <a:endParaRPr lang="en-GB" dirty="0"/>
-          </a:p>
-          <a:p>
-            <a:pPr marL="36900" indent="0">
-              <a:buNone/>
-            </a:pPr>
-            <a:endParaRPr lang="en-GB" dirty="0"/>
-          </a:p>
-        </p:txBody>
-      </p:sp>
-    </p:spTree>
-    <p:extLst>
-      <p:ext uri="{BB962C8B-B14F-4D97-AF65-F5344CB8AC3E}">
-        <p14:creationId xmlns:p14="http://schemas.microsoft.com/office/powerpoint/2010/main" val="2479982835"/>
-      </p:ext>
-    </p:extLst>
-  </p:cSld>
-  <p:clrMapOvr>
-    <a:masterClrMapping/>
-  </p:clrMapOvr>
-</p:sld>
-</file>
-
 <file path=ppt/slides/slide31.xml><?xml version="1.0" encoding="utf-8"?>
 <p:sld xmlns:a="http://schemas.openxmlformats.org/drawingml/2006/main" xmlns:r="http://schemas.openxmlformats.org/officeDocument/2006/relationships" xmlns:p="http://schemas.openxmlformats.org/presentationml/2006/main">
   <p:cSld>
@@ -10161,7 +10506,7 @@
           <p:cNvPr id="2" name="Title 1">
             <a:extLst>
               <a:ext uri="{FF2B5EF4-FFF2-40B4-BE49-F238E27FC236}">
-                <a16:creationId xmlns:a16="http://schemas.microsoft.com/office/drawing/2014/main" id="{45BFB080-C61B-4B41-815E-BA9FE7FFAF5C}"/>
+                <a16:creationId xmlns:a16="http://schemas.microsoft.com/office/drawing/2014/main" id="{71DD7F62-F4EA-40E3-A92E-6C2291D6942D}"/>
               </a:ext>
             </a:extLst>
           </p:cNvPr>
@@ -10179,17 +10524,17 @@
           <a:p>
             <a:r>
               <a:rPr lang="en-GB" dirty="0"/>
-              <a:t>Coding</a:t>
-            </a:r>
-          </a:p>
-        </p:txBody>
-      </p:sp>
-      <p:sp>
-        <p:nvSpPr>
-          <p:cNvPr id="3" name="Text Placeholder 2">
+              <a:t>Jaeger Packages</a:t>
+            </a:r>
+          </a:p>
+        </p:txBody>
+      </p:sp>
+      <p:sp>
+        <p:nvSpPr>
+          <p:cNvPr id="3" name="Content Placeholder 2">
             <a:extLst>
               <a:ext uri="{FF2B5EF4-FFF2-40B4-BE49-F238E27FC236}">
-                <a16:creationId xmlns:a16="http://schemas.microsoft.com/office/drawing/2014/main" id="{FFD52659-63DB-4A7D-BBC3-7704E7A8960F}"/>
+                <a16:creationId xmlns:a16="http://schemas.microsoft.com/office/drawing/2014/main" id="{0DBFB599-BE8F-4683-BE8A-81E173801E1F}"/>
               </a:ext>
             </a:extLst>
           </p:cNvPr>
@@ -10197,22 +10542,123 @@
             <a:spLocks noGrp="1"/>
           </p:cNvSpPr>
           <p:nvPr>
-            <p:ph type="body" idx="1"/>
-          </p:nvPr>
-        </p:nvSpPr>
-        <p:spPr/>
+            <p:ph idx="1"/>
+          </p:nvPr>
+        </p:nvSpPr>
+        <p:spPr>
+          <a:xfrm>
+            <a:off x="2874935" y="2112158"/>
+            <a:ext cx="6757261" cy="4058751"/>
+          </a:xfrm>
+        </p:spPr>
         <p:txBody>
           <a:bodyPr/>
           <a:lstStyle/>
           <a:p>
-            <a:endParaRPr lang="en-GB"/>
+            <a:r>
+              <a:rPr lang="en-GB" dirty="0" err="1">
+                <a:solidFill>
+                  <a:schemeClr val="accent1"/>
+                </a:solidFill>
+                <a:latin typeface="Cascadia Mono" panose="020B0609020000020004" pitchFamily="49" charset="0"/>
+                <a:cs typeface="Cascadia Mono" panose="020B0609020000020004" pitchFamily="49" charset="0"/>
+              </a:rPr>
+              <a:t>OpenTelemetry.Hosting.Extensions</a:t>
+            </a:r>
+            <a:endParaRPr lang="en-GB" dirty="0"/>
+          </a:p>
+          <a:p>
+            <a:pPr lvl="1"/>
+            <a:r>
+              <a:rPr lang="en-GB" dirty="0"/>
+              <a:t>The core </a:t>
+            </a:r>
+            <a:r>
+              <a:rPr lang="en-GB" dirty="0" err="1"/>
+              <a:t>OpenTelemetry</a:t>
+            </a:r>
+            <a:r>
+              <a:rPr lang="en-GB" dirty="0"/>
+              <a:t> library</a:t>
+            </a:r>
+          </a:p>
+          <a:p>
+            <a:r>
+              <a:rPr lang="en-GB" dirty="0" err="1">
+                <a:solidFill>
+                  <a:schemeClr val="accent1"/>
+                </a:solidFill>
+                <a:latin typeface="Cascadia Mono" panose="020B0609020000020004" pitchFamily="49" charset="0"/>
+                <a:cs typeface="Cascadia Mono" panose="020B0609020000020004" pitchFamily="49" charset="0"/>
+              </a:rPr>
+              <a:t>OpenTelemetry.Exporter.Jaeger</a:t>
+            </a:r>
+            <a:endParaRPr lang="en-GB" dirty="0"/>
+          </a:p>
+          <a:p>
+            <a:pPr lvl="1"/>
+            <a:r>
+              <a:rPr lang="en-GB" dirty="0"/>
+              <a:t>Exporter for Jaeger</a:t>
+            </a:r>
+          </a:p>
+          <a:p>
+            <a:r>
+              <a:rPr lang="en-GB" dirty="0" err="1">
+                <a:solidFill>
+                  <a:schemeClr val="accent1"/>
+                </a:solidFill>
+                <a:latin typeface="Cascadia Mono" panose="020B0609020000020004" pitchFamily="49" charset="0"/>
+                <a:cs typeface="Cascadia Mono" panose="020B0609020000020004" pitchFamily="49" charset="0"/>
+              </a:rPr>
+              <a:t>OpenTelemetry.Instrumentation.AspNetCore</a:t>
+            </a:r>
+            <a:endParaRPr lang="en-GB" dirty="0"/>
+          </a:p>
+          <a:p>
+            <a:pPr lvl="1"/>
+            <a:r>
+              <a:rPr lang="en-GB" dirty="0"/>
+              <a:t>Magic instrumentation for ASP.NET Core</a:t>
+            </a:r>
+          </a:p>
+          <a:p>
+            <a:r>
+              <a:rPr lang="en-GB" dirty="0" err="1">
+                <a:solidFill>
+                  <a:schemeClr val="accent1"/>
+                </a:solidFill>
+                <a:latin typeface="Cascadia Mono" panose="020B0609020000020004" pitchFamily="49" charset="0"/>
+                <a:cs typeface="Cascadia Mono" panose="020B0609020000020004" pitchFamily="49" charset="0"/>
+              </a:rPr>
+              <a:t>OpenTelemetry.Instrumentation.Http</a:t>
+            </a:r>
+            <a:endParaRPr lang="en-GB" dirty="0"/>
+          </a:p>
+          <a:p>
+            <a:pPr lvl="1"/>
+            <a:r>
+              <a:rPr lang="en-GB" dirty="0"/>
+              <a:t>Magic instrumentation for </a:t>
+            </a:r>
+            <a:r>
+              <a:rPr lang="en-GB" dirty="0" err="1"/>
+              <a:t>HttpClient</a:t>
+            </a:r>
+            <a:endParaRPr lang="en-GB" dirty="0"/>
+          </a:p>
+          <a:p>
+            <a:pPr marL="36900" indent="0">
+              <a:buNone/>
+            </a:pPr>
+            <a:endParaRPr lang="en-GB" dirty="0"/>
           </a:p>
         </p:txBody>
       </p:sp>
     </p:spTree>
     <p:extLst>
       <p:ext uri="{BB962C8B-B14F-4D97-AF65-F5344CB8AC3E}">
-        <p14:creationId xmlns:p14="http://schemas.microsoft.com/office/powerpoint/2010/main" val="3718408008"/>
+        <p14:creationId xmlns:p14="http://schemas.microsoft.com/office/powerpoint/2010/main" val="2479982835"/>
       </p:ext>
     </p:extLst>
   </p:cSld>
@@ -10241,10 +10687,10 @@
       </p:grpSpPr>
       <p:sp>
         <p:nvSpPr>
-          <p:cNvPr id="4" name="Title 3">
+          <p:cNvPr id="2" name="Title 1">
             <a:extLst>
               <a:ext uri="{FF2B5EF4-FFF2-40B4-BE49-F238E27FC236}">
-                <a16:creationId xmlns:a16="http://schemas.microsoft.com/office/drawing/2014/main" id="{6E668E8E-1DE4-47C8-94A2-CD91874CDA28}"/>
+                <a16:creationId xmlns:a16="http://schemas.microsoft.com/office/drawing/2014/main" id="{45BFB080-C61B-4B41-815E-BA9FE7FFAF5C}"/>
               </a:ext>
             </a:extLst>
           </p:cNvPr>
@@ -10262,17 +10708,17 @@
           <a:p>
             <a:r>
               <a:rPr lang="en-GB" dirty="0"/>
-              <a:t>Jaeger Dashboard</a:t>
-            </a:r>
-          </a:p>
-        </p:txBody>
-      </p:sp>
-      <p:sp>
-        <p:nvSpPr>
-          <p:cNvPr id="5" name="Content Placeholder 4">
+              <a:t>Coding</a:t>
+            </a:r>
+          </a:p>
+        </p:txBody>
+      </p:sp>
+      <p:sp>
+        <p:nvSpPr>
+          <p:cNvPr id="3" name="Text Placeholder 2">
             <a:extLst>
               <a:ext uri="{FF2B5EF4-FFF2-40B4-BE49-F238E27FC236}">
-                <a16:creationId xmlns:a16="http://schemas.microsoft.com/office/drawing/2014/main" id="{EDA0FD76-3514-4B3F-89D9-F8567B13DBBA}"/>
+                <a16:creationId xmlns:a16="http://schemas.microsoft.com/office/drawing/2014/main" id="{FFD52659-63DB-4A7D-BBC3-7704E7A8960F}"/>
               </a:ext>
             </a:extLst>
           </p:cNvPr>
@@ -10280,34 +10726,22 @@
             <a:spLocks noGrp="1"/>
           </p:cNvSpPr>
           <p:nvPr>
-            <p:ph idx="1"/>
-          </p:nvPr>
-        </p:nvSpPr>
-        <p:spPr>
-          <a:xfrm>
-            <a:off x="913795" y="2371241"/>
-            <a:ext cx="10353762" cy="3419959"/>
-          </a:xfrm>
-        </p:spPr>
+            <p:ph type="body" idx="1"/>
+          </p:nvPr>
+        </p:nvSpPr>
+        <p:spPr/>
         <p:txBody>
           <a:bodyPr/>
           <a:lstStyle/>
           <a:p>
-            <a:r>
-              <a:rPr lang="en-GB" dirty="0" err="1"/>
-              <a:t>kubectl</a:t>
-            </a:r>
-            <a:r>
-              <a:rPr lang="en-GB" dirty="0"/>
-              <a:t> get service jaeger-query</a:t>
-            </a:r>
+            <a:endParaRPr lang="en-GB"/>
           </a:p>
         </p:txBody>
       </p:sp>
     </p:spTree>
     <p:extLst>
       <p:ext uri="{BB962C8B-B14F-4D97-AF65-F5344CB8AC3E}">
-        <p14:creationId xmlns:p14="http://schemas.microsoft.com/office/powerpoint/2010/main" val="3208418245"/>
+        <p14:creationId xmlns:p14="http://schemas.microsoft.com/office/powerpoint/2010/main" val="3718408008"/>
       </p:ext>
     </p:extLst>
   </p:cSld>
@@ -10336,10 +10770,10 @@
       </p:grpSpPr>
       <p:sp>
         <p:nvSpPr>
-          <p:cNvPr id="2" name="Title 1">
+          <p:cNvPr id="4" name="Title 3">
             <a:extLst>
               <a:ext uri="{FF2B5EF4-FFF2-40B4-BE49-F238E27FC236}">
-                <a16:creationId xmlns:a16="http://schemas.microsoft.com/office/drawing/2014/main" id="{6EA2186F-6B5D-49B2-B885-245CDBF6FBF2}"/>
+                <a16:creationId xmlns:a16="http://schemas.microsoft.com/office/drawing/2014/main" id="{6E668E8E-1DE4-47C8-94A2-CD91874CDA28}"/>
               </a:ext>
             </a:extLst>
           </p:cNvPr>
@@ -10357,22 +10791,17 @@
           <a:p>
             <a:r>
               <a:rPr lang="en-GB" dirty="0"/>
-              <a:t>gRPC </a:t>
-            </a:r>
-            <a:r>
-              <a:rPr lang="en-GB" dirty="0" err="1"/>
-              <a:t>Healthchecks</a:t>
-            </a:r>
-            <a:endParaRPr lang="en-GB" dirty="0"/>
-          </a:p>
-        </p:txBody>
-      </p:sp>
-      <p:sp>
-        <p:nvSpPr>
-          <p:cNvPr id="3" name="Text Placeholder 2">
+              <a:t>Jaeger Dashboard</a:t>
+            </a:r>
+          </a:p>
+        </p:txBody>
+      </p:sp>
+      <p:sp>
+        <p:nvSpPr>
+          <p:cNvPr id="5" name="Content Placeholder 4">
             <a:extLst>
               <a:ext uri="{FF2B5EF4-FFF2-40B4-BE49-F238E27FC236}">
-                <a16:creationId xmlns:a16="http://schemas.microsoft.com/office/drawing/2014/main" id="{B9C11C8C-309A-4D90-B6DF-9FB8265408CB}"/>
+                <a16:creationId xmlns:a16="http://schemas.microsoft.com/office/drawing/2014/main" id="{EDA0FD76-3514-4B3F-89D9-F8567B13DBBA}"/>
               </a:ext>
             </a:extLst>
           </p:cNvPr>
@@ -10380,22 +10809,34 @@
             <a:spLocks noGrp="1"/>
           </p:cNvSpPr>
           <p:nvPr>
-            <p:ph type="body" idx="1"/>
-          </p:nvPr>
-        </p:nvSpPr>
-        <p:spPr/>
+            <p:ph idx="1"/>
+          </p:nvPr>
+        </p:nvSpPr>
+        <p:spPr>
+          <a:xfrm>
+            <a:off x="913795" y="2371241"/>
+            <a:ext cx="10353762" cy="3419959"/>
+          </a:xfrm>
+        </p:spPr>
         <p:txBody>
           <a:bodyPr/>
           <a:lstStyle/>
           <a:p>
-            <a:endParaRPr lang="en-GB"/>
+            <a:r>
+              <a:rPr lang="en-GB" dirty="0" err="1"/>
+              <a:t>kubectl</a:t>
+            </a:r>
+            <a:r>
+              <a:rPr lang="en-GB" dirty="0"/>
+              <a:t> get service jaeger-query</a:t>
+            </a:r>
           </a:p>
         </p:txBody>
       </p:sp>
     </p:spTree>
     <p:extLst>
       <p:ext uri="{BB962C8B-B14F-4D97-AF65-F5344CB8AC3E}">
-        <p14:creationId xmlns:p14="http://schemas.microsoft.com/office/powerpoint/2010/main" val="3795543760"/>
+        <p14:creationId xmlns:p14="http://schemas.microsoft.com/office/powerpoint/2010/main" val="3208418245"/>
       </p:ext>
     </p:extLst>
   </p:cSld>
@@ -10427,6 +10868,94 @@
           <p:cNvPr id="2" name="Title 1">
             <a:extLst>
               <a:ext uri="{FF2B5EF4-FFF2-40B4-BE49-F238E27FC236}">
+                <a16:creationId xmlns:a16="http://schemas.microsoft.com/office/drawing/2014/main" id="{6EA2186F-6B5D-49B2-B885-245CDBF6FBF2}"/>
+              </a:ext>
+            </a:extLst>
+          </p:cNvPr>
+          <p:cNvSpPr>
+            <a:spLocks noGrp="1"/>
+          </p:cNvSpPr>
+          <p:nvPr>
+            <p:ph type="title"/>
+          </p:nvPr>
+        </p:nvSpPr>
+        <p:spPr/>
+        <p:txBody>
+          <a:bodyPr/>
+          <a:lstStyle/>
+          <a:p>
+            <a:r>
+              <a:rPr lang="en-GB" dirty="0"/>
+              <a:t>gRPC </a:t>
+            </a:r>
+            <a:r>
+              <a:rPr lang="en-GB" dirty="0" err="1"/>
+              <a:t>Healthchecks</a:t>
+            </a:r>
+            <a:endParaRPr lang="en-GB" dirty="0"/>
+          </a:p>
+        </p:txBody>
+      </p:sp>
+      <p:sp>
+        <p:nvSpPr>
+          <p:cNvPr id="3" name="Text Placeholder 2">
+            <a:extLst>
+              <a:ext uri="{FF2B5EF4-FFF2-40B4-BE49-F238E27FC236}">
+                <a16:creationId xmlns:a16="http://schemas.microsoft.com/office/drawing/2014/main" id="{B9C11C8C-309A-4D90-B6DF-9FB8265408CB}"/>
+              </a:ext>
+            </a:extLst>
+          </p:cNvPr>
+          <p:cNvSpPr>
+            <a:spLocks noGrp="1"/>
+          </p:cNvSpPr>
+          <p:nvPr>
+            <p:ph type="body" idx="1"/>
+          </p:nvPr>
+        </p:nvSpPr>
+        <p:spPr/>
+        <p:txBody>
+          <a:bodyPr/>
+          <a:lstStyle/>
+          <a:p>
+            <a:endParaRPr lang="en-GB"/>
+          </a:p>
+        </p:txBody>
+      </p:sp>
+    </p:spTree>
+    <p:extLst>
+      <p:ext uri="{BB962C8B-B14F-4D97-AF65-F5344CB8AC3E}">
+        <p14:creationId xmlns:p14="http://schemas.microsoft.com/office/powerpoint/2010/main" val="3795543760"/>
+      </p:ext>
+    </p:extLst>
+  </p:cSld>
+  <p:clrMapOvr>
+    <a:masterClrMapping/>
+  </p:clrMapOvr>
+</p:sld>
+</file>
+
+<file path=ppt/slides/slide35.xml><?xml version="1.0" encoding="utf-8"?>
+<p:sld xmlns:a="http://schemas.openxmlformats.org/drawingml/2006/main" xmlns:r="http://schemas.openxmlformats.org/officeDocument/2006/relationships" xmlns:p="http://schemas.openxmlformats.org/presentationml/2006/main">
+  <p:cSld>
+    <p:spTree>
+      <p:nvGrpSpPr>
+        <p:cNvPr id="1" name=""/>
+        <p:cNvGrpSpPr/>
+        <p:nvPr/>
+      </p:nvGrpSpPr>
+      <p:grpSpPr>
+        <a:xfrm>
+          <a:off x="0" y="0"/>
+          <a:ext cx="0" cy="0"/>
+          <a:chOff x="0" y="0"/>
+          <a:chExt cx="0" cy="0"/>
+        </a:xfrm>
+      </p:grpSpPr>
+      <p:sp>
+        <p:nvSpPr>
+          <p:cNvPr id="2" name="Title 1">
+            <a:extLst>
+              <a:ext uri="{FF2B5EF4-FFF2-40B4-BE49-F238E27FC236}">
                 <a16:creationId xmlns:a16="http://schemas.microsoft.com/office/drawing/2014/main" id="{B502D511-20F0-44D5-82D8-DFF893E7BF70}"/>
               </a:ext>
             </a:extLst>
@@ -11081,7 +11610,129 @@
 </p:sld>
 </file>
 
-<file path=ppt/slides/slide35.xml><?xml version="1.0" encoding="utf-8"?>
+<file path=ppt/slides/slide36.xml><?xml version="1.0" encoding="utf-8"?>
+<p:sld xmlns:a="http://schemas.openxmlformats.org/drawingml/2006/main" xmlns:r="http://schemas.openxmlformats.org/officeDocument/2006/relationships" xmlns:p="http://schemas.openxmlformats.org/presentationml/2006/main">
+  <p:cSld>
+    <p:spTree>
+      <p:nvGrpSpPr>
+        <p:cNvPr id="1" name=""/>
+        <p:cNvGrpSpPr/>
+        <p:nvPr/>
+      </p:nvGrpSpPr>
+      <p:grpSpPr>
+        <a:xfrm>
+          <a:off x="0" y="0"/>
+          <a:ext cx="0" cy="0"/>
+          <a:chOff x="0" y="0"/>
+          <a:chExt cx="0" cy="0"/>
+        </a:xfrm>
+      </p:grpSpPr>
+      <p:sp>
+        <p:nvSpPr>
+          <p:cNvPr id="2" name="Title 1">
+            <a:extLst>
+              <a:ext uri="{FF2B5EF4-FFF2-40B4-BE49-F238E27FC236}">
+                <a16:creationId xmlns:a16="http://schemas.microsoft.com/office/drawing/2014/main" id="{2F7909FD-4D57-4739-B433-ACED3F984E4D}"/>
+              </a:ext>
+            </a:extLst>
+          </p:cNvPr>
+          <p:cNvSpPr>
+            <a:spLocks noGrp="1"/>
+          </p:cNvSpPr>
+          <p:nvPr>
+            <p:ph type="title"/>
+          </p:nvPr>
+        </p:nvSpPr>
+        <p:spPr/>
+        <p:txBody>
+          <a:bodyPr/>
+          <a:lstStyle/>
+          <a:p>
+            <a:r>
+              <a:rPr lang="en-GB" dirty="0" err="1"/>
+              <a:t>Grpc.HealthCheck</a:t>
+            </a:r>
+            <a:endParaRPr lang="en-GB" dirty="0"/>
+          </a:p>
+        </p:txBody>
+      </p:sp>
+      <p:sp>
+        <p:nvSpPr>
+          <p:cNvPr id="3" name="Content Placeholder 2">
+            <a:extLst>
+              <a:ext uri="{FF2B5EF4-FFF2-40B4-BE49-F238E27FC236}">
+                <a16:creationId xmlns:a16="http://schemas.microsoft.com/office/drawing/2014/main" id="{22F8D0A1-0E1C-4CA8-9031-A59ACF843D45}"/>
+              </a:ext>
+            </a:extLst>
+          </p:cNvPr>
+          <p:cNvSpPr>
+            <a:spLocks noGrp="1"/>
+          </p:cNvSpPr>
+          <p:nvPr>
+            <p:ph idx="1"/>
+          </p:nvPr>
+        </p:nvSpPr>
+        <p:spPr/>
+        <p:txBody>
+          <a:bodyPr/>
+          <a:lstStyle/>
+          <a:p>
+            <a:pPr marL="36900" indent="0" algn="ctr">
+              <a:buNone/>
+            </a:pPr>
+            <a:endParaRPr lang="en-GB" dirty="0"/>
+          </a:p>
+          <a:p>
+            <a:pPr marL="36900" indent="0" algn="ctr">
+              <a:buNone/>
+            </a:pPr>
+            <a:r>
+              <a:rPr lang="en-GB" dirty="0">
+                <a:solidFill>
+                  <a:schemeClr val="accent1">
+                    <a:lumMod val="60000"/>
+                    <a:lumOff val="40000"/>
+                  </a:schemeClr>
+                </a:solidFill>
+              </a:rPr>
+              <a:t>nuget.org/packages/</a:t>
+            </a:r>
+            <a:r>
+              <a:rPr lang="en-GB" dirty="0" err="1">
+                <a:solidFill>
+                  <a:schemeClr val="accent1">
+                    <a:lumMod val="60000"/>
+                    <a:lumOff val="40000"/>
+                  </a:schemeClr>
+                </a:solidFill>
+              </a:rPr>
+              <a:t>Grpc.HealthCheck</a:t>
+            </a:r>
+            <a:endParaRPr lang="en-GB" dirty="0">
+              <a:solidFill>
+                <a:schemeClr val="accent1">
+                  <a:lumMod val="60000"/>
+                  <a:lumOff val="40000"/>
+                </a:schemeClr>
+              </a:solidFill>
+            </a:endParaRPr>
+          </a:p>
+        </p:txBody>
+      </p:sp>
+    </p:spTree>
+    <p:extLst>
+      <p:ext uri="{BB962C8B-B14F-4D97-AF65-F5344CB8AC3E}">
+        <p14:creationId xmlns:p14="http://schemas.microsoft.com/office/powerpoint/2010/main" val="2593498108"/>
+      </p:ext>
+    </p:extLst>
+  </p:cSld>
+  <p:clrMapOvr>
+    <a:masterClrMapping/>
+  </p:clrMapOvr>
+</p:sld>
+</file>
+
+<file path=ppt/slides/slide37.xml><?xml version="1.0" encoding="utf-8"?>
 <p:sld xmlns:a="http://schemas.openxmlformats.org/drawingml/2006/main" xmlns:r="http://schemas.openxmlformats.org/officeDocument/2006/relationships" xmlns:p="http://schemas.openxmlformats.org/presentationml/2006/main">
   <p:cSld>
     <p:spTree>

</xml_diff>